<commit_message>
process file modified, got all motor functions in new file motor.h, now using interrupts, removed uart0 file
</commit_message>
<xml_diff>
--- a/Presentation.pptx
+++ b/Presentation.pptx
@@ -1156,7 +1156,7 @@
             <a:fld id="{B61BEF0D-F0BB-DE4B-95CE-6DB70DBA9567}" type="datetimeFigureOut">
               <a:rPr lang="en-US" smtClean="0"/>
               <a:pPr/>
-              <a:t>4/8/2015</a:t>
+              <a:t>4/9/2015</a:t>
             </a:fld>
             <a:endParaRPr lang="en-US" dirty="0"/>
           </a:p>
@@ -1599,7 +1599,7 @@
             <a:fld id="{B61BEF0D-F0BB-DE4B-95CE-6DB70DBA9567}" type="datetimeFigureOut">
               <a:rPr lang="en-US" smtClean="0"/>
               <a:pPr/>
-              <a:t>4/8/2015</a:t>
+              <a:t>4/9/2015</a:t>
             </a:fld>
             <a:endParaRPr lang="en-US" dirty="0"/>
           </a:p>
@@ -1857,7 +1857,7 @@
             <a:fld id="{B61BEF0D-F0BB-DE4B-95CE-6DB70DBA9567}" type="datetimeFigureOut">
               <a:rPr lang="en-US" smtClean="0"/>
               <a:pPr/>
-              <a:t>4/8/2015</a:t>
+              <a:t>4/9/2015</a:t>
             </a:fld>
             <a:endParaRPr lang="en-US" dirty="0"/>
           </a:p>
@@ -2173,7 +2173,7 @@
             <a:fld id="{B61BEF0D-F0BB-DE4B-95CE-6DB70DBA9567}" type="datetimeFigureOut">
               <a:rPr lang="en-US" smtClean="0"/>
               <a:pPr/>
-              <a:t>4/8/2015</a:t>
+              <a:t>4/9/2015</a:t>
             </a:fld>
             <a:endParaRPr lang="en-US" dirty="0"/>
           </a:p>
@@ -2499,7 +2499,7 @@
             <a:fld id="{B61BEF0D-F0BB-DE4B-95CE-6DB70DBA9567}" type="datetimeFigureOut">
               <a:rPr lang="en-US" smtClean="0"/>
               <a:pPr/>
-              <a:t>4/8/2015</a:t>
+              <a:t>4/9/2015</a:t>
             </a:fld>
             <a:endParaRPr lang="en-US" dirty="0"/>
           </a:p>
@@ -2809,7 +2809,7 @@
             <a:fld id="{B61BEF0D-F0BB-DE4B-95CE-6DB70DBA9567}" type="datetimeFigureOut">
               <a:rPr lang="en-US" smtClean="0"/>
               <a:pPr/>
-              <a:t>4/8/2015</a:t>
+              <a:t>4/9/2015</a:t>
             </a:fld>
             <a:endParaRPr lang="en-US" dirty="0"/>
           </a:p>
@@ -3184,7 +3184,7 @@
             <a:fld id="{B61BEF0D-F0BB-DE4B-95CE-6DB70DBA9567}" type="datetimeFigureOut">
               <a:rPr lang="en-US" smtClean="0"/>
               <a:pPr/>
-              <a:t>4/8/2015</a:t>
+              <a:t>4/9/2015</a:t>
             </a:fld>
             <a:endParaRPr lang="en-US" dirty="0"/>
           </a:p>
@@ -3366,7 +3366,7 @@
             <a:fld id="{B61BEF0D-F0BB-DE4B-95CE-6DB70DBA9567}" type="datetimeFigureOut">
               <a:rPr lang="en-US" smtClean="0"/>
               <a:pPr/>
-              <a:t>4/8/2015</a:t>
+              <a:t>4/9/2015</a:t>
             </a:fld>
             <a:endParaRPr lang="en-US" dirty="0"/>
           </a:p>
@@ -3554,7 +3554,7 @@
             <a:fld id="{B61BEF0D-F0BB-DE4B-95CE-6DB70DBA9567}" type="datetimeFigureOut">
               <a:rPr lang="en-US" smtClean="0"/>
               <a:pPr/>
-              <a:t>4/8/2015</a:t>
+              <a:t>4/9/2015</a:t>
             </a:fld>
             <a:endParaRPr lang="en-US" dirty="0"/>
           </a:p>
@@ -3972,7 +3972,7 @@
           <a:p>
             <a:fld id="{52647F38-B617-4D2F-AE0A-013F0C4D2C57}" type="datetimeFigureOut">
               <a:rPr lang="en-US" smtClean="0"/>
-              <a:t>4/8/2015</a:t>
+              <a:t>4/9/2015</a:t>
             </a:fld>
             <a:endParaRPr lang="en-US" dirty="0"/>
           </a:p>
@@ -4230,7 +4230,7 @@
             <a:fld id="{B61BEF0D-F0BB-DE4B-95CE-6DB70DBA9567}" type="datetimeFigureOut">
               <a:rPr lang="en-US" smtClean="0"/>
               <a:pPr/>
-              <a:t>4/8/2015</a:t>
+              <a:t>4/9/2015</a:t>
             </a:fld>
             <a:endParaRPr lang="en-US" dirty="0"/>
           </a:p>
@@ -4473,7 +4473,7 @@
           <a:p>
             <a:fld id="{05BFA754-D5C3-4E66-96A6-867B257F58DC}" type="datetimeFigureOut">
               <a:rPr lang="en-US" smtClean="0"/>
-              <a:t>4/8/2015</a:t>
+              <a:t>4/9/2015</a:t>
             </a:fld>
             <a:endParaRPr lang="en-US" dirty="0"/>
           </a:p>
@@ -4863,7 +4863,7 @@
             <a:fld id="{B61BEF0D-F0BB-DE4B-95CE-6DB70DBA9567}" type="datetimeFigureOut">
               <a:rPr lang="en-US" smtClean="0"/>
               <a:pPr/>
-              <a:t>4/8/2015</a:t>
+              <a:t>4/9/2015</a:t>
             </a:fld>
             <a:endParaRPr lang="en-US" dirty="0"/>
           </a:p>
@@ -4989,7 +4989,7 @@
             <a:fld id="{B61BEF0D-F0BB-DE4B-95CE-6DB70DBA9567}" type="datetimeFigureOut">
               <a:rPr lang="en-US" smtClean="0"/>
               <a:pPr/>
-              <a:t>4/8/2015</a:t>
+              <a:t>4/9/2015</a:t>
             </a:fld>
             <a:endParaRPr lang="en-US" dirty="0"/>
           </a:p>
@@ -5091,7 +5091,7 @@
             <a:fld id="{B61BEF0D-F0BB-DE4B-95CE-6DB70DBA9567}" type="datetimeFigureOut">
               <a:rPr lang="en-US" smtClean="0"/>
               <a:pPr/>
-              <a:t>4/8/2015</a:t>
+              <a:t>4/9/2015</a:t>
             </a:fld>
             <a:endParaRPr lang="en-US" dirty="0"/>
           </a:p>
@@ -5354,7 +5354,7 @@
             <a:fld id="{B61BEF0D-F0BB-DE4B-95CE-6DB70DBA9567}" type="datetimeFigureOut">
               <a:rPr lang="en-US" smtClean="0"/>
               <a:pPr/>
-              <a:t>4/8/2015</a:t>
+              <a:t>4/9/2015</a:t>
             </a:fld>
             <a:endParaRPr lang="en-US" dirty="0"/>
           </a:p>
@@ -5645,7 +5645,7 @@
             <a:fld id="{B61BEF0D-F0BB-DE4B-95CE-6DB70DBA9567}" type="datetimeFigureOut">
               <a:rPr lang="en-US" smtClean="0"/>
               <a:pPr/>
-              <a:t>4/8/2015</a:t>
+              <a:t>4/9/2015</a:t>
             </a:fld>
             <a:endParaRPr lang="en-US" dirty="0"/>
           </a:p>
@@ -6059,7 +6059,7 @@
             <a:fld id="{B61BEF0D-F0BB-DE4B-95CE-6DB70DBA9567}" type="datetimeFigureOut">
               <a:rPr lang="en-US" smtClean="0"/>
               <a:pPr/>
-              <a:t>4/8/2015</a:t>
+              <a:t>4/9/2015</a:t>
             </a:fld>
             <a:endParaRPr lang="en-US" dirty="0"/>
           </a:p>
@@ -7974,7 +7974,31 @@
                 </a:solidFill>
                 <a:latin typeface="Agency FB" panose="020B0503020202020204" pitchFamily="34" charset="0"/>
               </a:rPr>
-              <a:t> Audio Morse code signals will be sent to the bot from source. The signal should be received without attenuation, converted into a pulse signal, and it should then be expressed as a series of </a:t>
+              <a:t> Audio Morse code signals will be sent to the bot from source. The signal should be received without </a:t>
+            </a:r>
+            <a:r>
+              <a:rPr lang="en-GB" sz="2800" dirty="0" smtClean="0">
+                <a:solidFill>
+                  <a:schemeClr val="bg1">
+                    <a:lumMod val="95000"/>
+                    <a:lumOff val="5000"/>
+                  </a:schemeClr>
+                </a:solidFill>
+                <a:latin typeface="Agency FB" panose="020B0503020202020204" pitchFamily="34" charset="0"/>
+              </a:rPr>
+              <a:t>attenuation</a:t>
+            </a:r>
+            <a:r>
+              <a:rPr lang="en-GB" sz="2800" dirty="0" smtClean="0">
+                <a:solidFill>
+                  <a:schemeClr val="bg1">
+                    <a:lumMod val="95000"/>
+                    <a:lumOff val="5000"/>
+                  </a:schemeClr>
+                </a:solidFill>
+                <a:latin typeface="Agency FB" panose="020B0503020202020204" pitchFamily="34" charset="0"/>
+              </a:rPr>
+              <a:t>, converted into a pulse signal, and it should then be expressed as a series of </a:t>
             </a:r>
             <a:r>
               <a:rPr lang="en-GB" sz="2800" dirty="0" err="1" smtClean="0">
@@ -8393,19 +8417,7 @@
                 </a:solidFill>
                 <a:latin typeface="Agency FB" panose="020B0503020202020204" pitchFamily="34" charset="0"/>
               </a:rPr>
-              <a:t>After the bot receives the signal , the bot should be able to transmit Morse code , conveying that it has received the signal. Also, after completing the required task the bot should be able to transmit Morse code. The morse code transmission to be done using </a:t>
-            </a:r>
-            <a:r>
-              <a:rPr lang="en-GB" sz="2800" dirty="0" smtClean="0">
-                <a:solidFill>
-                  <a:schemeClr val="bg1">
-                    <a:lumMod val="95000"/>
-                    <a:lumOff val="5000"/>
-                  </a:schemeClr>
-                </a:solidFill>
-                <a:latin typeface="Agency FB" panose="020B0503020202020204" pitchFamily="34" charset="0"/>
-              </a:rPr>
-              <a:t>on board buzzer.</a:t>
+              <a:t>After the bot receives the signal , the bot should be able to transmit Morse code , conveying that it has received the signal. Also, after completing the required task the bot should be able to transmit Morse code. The morse code transmission to be done using on board buzzer.</a:t>
             </a:r>
             <a:endParaRPr lang="en-US" sz="2800" dirty="0">
               <a:solidFill>
@@ -8608,7 +8620,7 @@
         </p:blipFill>
         <p:spPr>
           <a:xfrm>
-            <a:off x="286600" y="0"/>
+            <a:off x="1542198" y="703384"/>
             <a:ext cx="3436092" cy="5143500"/>
           </a:xfrm>
           <a:prstGeom prst="rect">
@@ -8682,7 +8694,25 @@
               <a:rPr lang="en-US" sz="2800" i="1" dirty="0" smtClean="0">
                 <a:latin typeface="Agency FB" panose="020B0503020202020204" pitchFamily="34" charset="0"/>
               </a:rPr>
-              <a:t>orse code decoder was that part of the project in which we had to first make the hardware for receiving signal from the microphone, and then, had to convert those received signals into </a:t>
+              <a:t>orse code decoder was that part of the project in which we had to </a:t>
+            </a:r>
+            <a:r>
+              <a:rPr lang="en-US" sz="2800" i="1" dirty="0" smtClean="0">
+                <a:latin typeface="Agency FB" panose="020B0503020202020204" pitchFamily="34" charset="0"/>
+              </a:rPr>
+              <a:t> and </a:t>
+            </a:r>
+            <a:r>
+              <a:rPr lang="en-US" sz="2800" i="1" dirty="0" smtClean="0">
+                <a:latin typeface="Agency FB" panose="020B0503020202020204" pitchFamily="34" charset="0"/>
+              </a:rPr>
+              <a:t>first </a:t>
+            </a:r>
+            <a:r>
+              <a:rPr lang="en-US" sz="2800" i="1" dirty="0" smtClean="0">
+                <a:latin typeface="Agency FB" panose="020B0503020202020204" pitchFamily="34" charset="0"/>
+              </a:rPr>
+              <a:t>make the hardware for receiving signal from the microphone, and then, had to convert those received signals into </a:t>
             </a:r>
             <a:r>
               <a:rPr lang="en-US" sz="2800" i="1" dirty="0" err="1" smtClean="0">
@@ -9023,13 +9053,7 @@
               <a:rPr lang="en-US" sz="2800" i="1" dirty="0" smtClean="0">
                 <a:latin typeface="Agency FB" panose="020B0503020202020204" pitchFamily="34" charset="0"/>
               </a:rPr>
-              <a:t>The circuit for the microphone receiver is as shown </a:t>
-            </a:r>
-            <a:r>
-              <a:rPr lang="en-US" sz="2800" i="1" dirty="0" smtClean="0">
-                <a:latin typeface="Agency FB" panose="020B0503020202020204" pitchFamily="34" charset="0"/>
-              </a:rPr>
-              <a:t>below  :</a:t>
+              <a:t>The circuit for the microphone receiver is as shown below  :</a:t>
             </a:r>
             <a:endParaRPr lang="en-US" sz="2800" i="1" dirty="0">
               <a:latin typeface="Agency FB" panose="020B0503020202020204" pitchFamily="34" charset="0"/>
@@ -9184,17 +9208,8 @@
               <a:rPr lang="en-US" sz="2800" i="1" dirty="0" smtClean="0">
                 <a:latin typeface="Agency FB" panose="020B0503020202020204" pitchFamily="34" charset="0"/>
               </a:rPr>
-              <a:t>The input to the circuit is </a:t>
-            </a:r>
-            <a:r>
-              <a:rPr lang="en-US" sz="2800" i="1" dirty="0" smtClean="0">
-                <a:latin typeface="Agency FB" panose="020B0503020202020204" pitchFamily="34" charset="0"/>
-              </a:rPr>
-              <a:t>of the form :</a:t>
-            </a:r>
-            <a:endParaRPr lang="en-US" sz="2800" i="1" dirty="0" smtClean="0">
-              <a:latin typeface="Agency FB" panose="020B0503020202020204" pitchFamily="34" charset="0"/>
-            </a:endParaRPr>
+              <a:t>The input to the circuit is of the form :</a:t>
+            </a:r>
           </a:p>
           <a:p>
             <a:r>
@@ -9528,7 +9543,7 @@
   <a:extraClrSchemeLst/>
   <a:extLst>
     <a:ext uri="{05A4C25C-085E-4340-85A3-A5531E510DB2}">
-      <thm15:themeFamily xmlns:thm15="http://schemas.microsoft.com/office/thememl/2012/main" xmlns="" name="Slice" id="{0507925B-6AC9-4358-8E18-C330545D08F8}" vid="{13FEC7C6-62A9-40C4-99D2-581AACACAA2F}"/>
+      <thm15:themeFamily xmlns="" xmlns:thm15="http://schemas.microsoft.com/office/thememl/2012/main" name="Slice" id="{0507925B-6AC9-4358-8E18-C330545D08F8}" vid="{13FEC7C6-62A9-40C4-99D2-581AACACAA2F}"/>
     </a:ext>
   </a:extLst>
 </a:theme>

</xml_diff>